<commit_message>
Added SRI and XML sitemap
</commit_message>
<xml_diff>
--- a/ppt/Slide.pptx
+++ b/ppt/Slide.pptx
@@ -7954,7 +7954,7 @@
           <a:p>
             <a:r>
               <a:rPr lang="en-AU" dirty="0"/>
-              <a:t>A name card style</a:t>
+              <a:t>A name-card-style box</a:t>
             </a:r>
           </a:p>
           <a:p>
@@ -8586,7 +8586,7 @@
           <a:p>
             <a:r>
               <a:rPr lang="en-AU" dirty="0"/>
-              <a:t>A background picture with opacity</a:t>
+              <a:t>Title with a background picture with opacity</a:t>
             </a:r>
           </a:p>
           <a:p>
@@ -8896,7 +8896,7 @@
           <a:p>
             <a:r>
               <a:rPr lang="en-AU" dirty="0"/>
-              <a:t>Icons of contact methods</a:t>
+              <a:t>Big icons of contact methods</a:t>
             </a:r>
           </a:p>
           <a:p>
@@ -9173,7 +9173,7 @@
           <a:p>
             <a:r>
               <a:rPr lang="en-AU" dirty="0"/>
-              <a:t>Lesson Learned</a:t>
+              <a:t>A Small Lesson I Learned</a:t>
             </a:r>
           </a:p>
         </p:txBody>
@@ -9324,16 +9324,35 @@
             <p:ph type="title"/>
           </p:nvPr>
         </p:nvSpPr>
-        <p:spPr/>
+        <p:spPr>
+          <a:xfrm>
+            <a:off x="727650" y="1841545"/>
+            <a:ext cx="7688700" cy="1460409"/>
+          </a:xfrm>
+        </p:spPr>
         <p:txBody>
           <a:bodyPr>
-            <a:normAutofit fontScale="90000"/>
+            <a:normAutofit/>
           </a:bodyPr>
           <a:lstStyle/>
           <a:p>
             <a:r>
               <a:rPr lang="en-AU" dirty="0"/>
-              <a:t>Thanks for Listening</a:t>
+              <a:t>Thank You   </a:t>
+            </a:r>
+            <a:br>
+              <a:rPr lang="en-AU" dirty="0"/>
+            </a:br>
+            <a:r>
+              <a:rPr lang="en-AU" dirty="0"/>
+              <a:t> </a:t>
+            </a:r>
+            <a:br>
+              <a:rPr lang="en-AU" dirty="0"/>
+            </a:br>
+            <a:r>
+              <a:rPr lang="en-AU" dirty="0"/>
+              <a:t>(●’◡’●)</a:t>
             </a:r>
           </a:p>
         </p:txBody>
@@ -9429,7 +9448,7 @@
             </a:pPr>
             <a:r>
               <a:rPr lang="en-AU" dirty="0"/>
-              <a:t>A simple website based on purely HTML and CSS.</a:t>
+              <a:t>A simple website based on HTML and CSS.</a:t>
             </a:r>
           </a:p>
           <a:p>
@@ -9551,7 +9570,12 @@
             <p:ph type="body" idx="1"/>
           </p:nvPr>
         </p:nvSpPr>
-        <p:spPr/>
+        <p:spPr>
+          <a:xfrm>
+            <a:off x="729450" y="2078875"/>
+            <a:ext cx="7688700" cy="2376584"/>
+          </a:xfrm>
+        </p:spPr>
         <p:txBody>
           <a:bodyPr/>
           <a:lstStyle/>
@@ -9627,15 +9651,23 @@
             </a:r>
             <a:r>
               <a:rPr lang="en-AU" sz="2000" dirty="0"/>
-              <a:t> Loop</a:t>
+              <a:t> Loop… </a:t>
             </a:r>
             <a:r>
               <a:rPr lang="en-AU" sz="2000" dirty="0">
                 <a:sym typeface="Wingdings" panose="05000000000000000000" pitchFamily="2" charset="2"/>
               </a:rPr>
-              <a:t></a:t>
+              <a:t>⌛</a:t>
             </a:r>
-            <a:endParaRPr lang="en-AU" sz="2000" dirty="0"/>
+          </a:p>
+          <a:p>
+            <a:pPr marL="488950" indent="-342900">
+              <a:buAutoNum type="arabicPeriod"/>
+            </a:pPr>
+            <a:r>
+              <a:rPr lang="en-AU" sz="2000" dirty="0"/>
+              <a:t>Time to submit!</a:t>
+            </a:r>
           </a:p>
           <a:p>
             <a:pPr marL="488950" indent="-342900">
@@ -9894,6 +9926,55 @@
                                           <p:spTgt spid="3">
                                             <p:txEl>
                                               <p:pRg st="4" end="4"/>
+                                            </p:txEl>
+                                          </p:spTgt>
+                                        </p:tgtEl>
+                                        <p:attrNameLst>
+                                          <p:attrName>style.visibility</p:attrName>
+                                        </p:attrNameLst>
+                                      </p:cBhvr>
+                                      <p:to>
+                                        <p:strVal val="visible"/>
+                                      </p:to>
+                                    </p:set>
+                                  </p:childTnLst>
+                                </p:cTn>
+                              </p:par>
+                            </p:childTnLst>
+                          </p:cTn>
+                        </p:par>
+                      </p:childTnLst>
+                    </p:cTn>
+                  </p:par>
+                  <p:par>
+                    <p:cTn id="23" fill="hold">
+                      <p:stCondLst>
+                        <p:cond delay="indefinite"/>
+                      </p:stCondLst>
+                      <p:childTnLst>
+                        <p:par>
+                          <p:cTn id="24" fill="hold">
+                            <p:stCondLst>
+                              <p:cond delay="0"/>
+                            </p:stCondLst>
+                            <p:childTnLst>
+                              <p:par>
+                                <p:cTn id="25" presetID="1" presetClass="entr" presetSubtype="0" fill="hold" nodeType="clickEffect">
+                                  <p:stCondLst>
+                                    <p:cond delay="0"/>
+                                  </p:stCondLst>
+                                  <p:childTnLst>
+                                    <p:set>
+                                      <p:cBhvr>
+                                        <p:cTn id="26" dur="1" fill="hold">
+                                          <p:stCondLst>
+                                            <p:cond delay="0"/>
+                                          </p:stCondLst>
+                                        </p:cTn>
+                                        <p:tgtEl>
+                                          <p:spTgt spid="3">
+                                            <p:txEl>
+                                              <p:pRg st="5" end="5"/>
                                             </p:txEl>
                                           </p:spTgt>
                                         </p:tgtEl>

</xml_diff>